<commit_message>
addition of part 5 in the scenario.
</commit_message>
<xml_diff>
--- a/Overview.pptx
+++ b/Overview.pptx
@@ -5,7 +5,7 @@
     <p:sldMasterId id="2147483648" r:id="rId1"/>
   </p:sldMasterIdLst>
   <p:notesMasterIdLst>
-    <p:notesMasterId r:id="rId18"/>
+    <p:notesMasterId r:id="rId19"/>
   </p:notesMasterIdLst>
   <p:sldIdLst>
     <p:sldId id="256" r:id="rId2"/>
@@ -22,8 +22,9 @@
     <p:sldId id="272" r:id="rId13"/>
     <p:sldId id="265" r:id="rId14"/>
     <p:sldId id="271" r:id="rId15"/>
-    <p:sldId id="267" r:id="rId16"/>
-    <p:sldId id="275" r:id="rId17"/>
+    <p:sldId id="276" r:id="rId16"/>
+    <p:sldId id="267" r:id="rId17"/>
+    <p:sldId id="275" r:id="rId18"/>
   </p:sldIdLst>
   <p:sldSz cx="12192000" cy="6858000"/>
   <p:notesSz cx="6858000" cy="9144000"/>
@@ -212,7 +213,7 @@
           <a:p>
             <a:fld id="{F6008430-4437-B140-9146-15DEA0EE57B9}" type="datetimeFigureOut">
               <a:rPr lang="en-US" smtClean="0"/>
-              <a:t>2/11/21</a:t>
+              <a:t>6/7/21</a:t>
             </a:fld>
             <a:endParaRPr lang="en-US"/>
           </a:p>
@@ -1116,6 +1117,117 @@
 </p:notes>
 </file>
 
+<file path=ppt/notesSlides/notesSlide7.xml><?xml version="1.0" encoding="utf-8"?>
+<p:notes xmlns:a="http://schemas.openxmlformats.org/drawingml/2006/main" xmlns:r="http://schemas.openxmlformats.org/officeDocument/2006/relationships" xmlns:p="http://schemas.openxmlformats.org/presentationml/2006/main">
+  <p:cSld>
+    <p:spTree>
+      <p:nvGrpSpPr>
+        <p:cNvPr id="1" name=""/>
+        <p:cNvGrpSpPr/>
+        <p:nvPr/>
+      </p:nvGrpSpPr>
+      <p:grpSpPr>
+        <a:xfrm>
+          <a:off x="0" y="0"/>
+          <a:ext cx="0" cy="0"/>
+          <a:chOff x="0" y="0"/>
+          <a:chExt cx="0" cy="0"/>
+        </a:xfrm>
+      </p:grpSpPr>
+      <p:sp>
+        <p:nvSpPr>
+          <p:cNvPr id="2" name="Slide Image Placeholder 1"/>
+          <p:cNvSpPr>
+            <a:spLocks noGrp="1" noRot="1" noChangeAspect="1"/>
+          </p:cNvSpPr>
+          <p:nvPr>
+            <p:ph type="sldImg"/>
+          </p:nvPr>
+        </p:nvSpPr>
+        <p:spPr/>
+      </p:sp>
+      <p:sp>
+        <p:nvSpPr>
+          <p:cNvPr id="3" name="Notes Placeholder 2"/>
+          <p:cNvSpPr>
+            <a:spLocks noGrp="1"/>
+          </p:cNvSpPr>
+          <p:nvPr>
+            <p:ph type="body" idx="1"/>
+          </p:nvPr>
+        </p:nvSpPr>
+        <p:spPr/>
+        <p:txBody>
+          <a:bodyPr/>
+          <a:lstStyle/>
+          <a:p>
+            <a:r>
+              <a:rPr lang="en-US" dirty="0"/>
+              <a:t>https://</a:t>
+            </a:r>
+            <a:r>
+              <a:rPr lang="en-US" dirty="0" err="1"/>
+              <a:t>raw.githubusercontent.com</a:t>
+            </a:r>
+            <a:r>
+              <a:rPr lang="en-US" dirty="0"/>
+              <a:t>/</a:t>
+            </a:r>
+            <a:r>
+              <a:rPr lang="en-US" dirty="0" err="1"/>
+              <a:t>BrockDSL</a:t>
+            </a:r>
+            <a:r>
+              <a:rPr lang="en-US" dirty="0"/>
+              <a:t>/</a:t>
+            </a:r>
+            <a:r>
+              <a:rPr lang="en-US" dirty="0" err="1"/>
+              <a:t>github_for_researchers</a:t>
+            </a:r>
+            <a:r>
+              <a:rPr lang="en-US" dirty="0"/>
+              <a:t>/master/p5.pdf</a:t>
+            </a:r>
+          </a:p>
+        </p:txBody>
+      </p:sp>
+      <p:sp>
+        <p:nvSpPr>
+          <p:cNvPr id="4" name="Slide Number Placeholder 3"/>
+          <p:cNvSpPr>
+            <a:spLocks noGrp="1"/>
+          </p:cNvSpPr>
+          <p:nvPr>
+            <p:ph type="sldNum" sz="quarter" idx="5"/>
+          </p:nvPr>
+        </p:nvSpPr>
+        <p:spPr/>
+        <p:txBody>
+          <a:bodyPr/>
+          <a:lstStyle/>
+          <a:p>
+            <a:fld id="{F1DC61E3-FF50-854B-B90B-0603FB757FB1}" type="slidenum">
+              <a:rPr lang="en-US" smtClean="0"/>
+              <a:t>15</a:t>
+            </a:fld>
+            <a:endParaRPr lang="en-US"/>
+          </a:p>
+        </p:txBody>
+      </p:sp>
+    </p:spTree>
+    <p:extLst>
+      <p:ext uri="{BB962C8B-B14F-4D97-AF65-F5344CB8AC3E}">
+        <p14:creationId xmlns:p14="http://schemas.microsoft.com/office/powerpoint/2010/main" val="281985760"/>
+      </p:ext>
+    </p:extLst>
+  </p:cSld>
+  <p:clrMapOvr>
+    <a:masterClrMapping/>
+  </p:clrMapOvr>
+</p:notes>
+</file>
+
 <file path=ppt/slideLayouts/slideLayout1.xml><?xml version="1.0" encoding="utf-8"?>
 <p:sldLayout xmlns:a="http://schemas.openxmlformats.org/drawingml/2006/main" xmlns:r="http://schemas.openxmlformats.org/officeDocument/2006/relationships" xmlns:p="http://schemas.openxmlformats.org/presentationml/2006/main" type="title" preserve="1">
   <p:cSld name="Title Slide">
@@ -1263,7 +1375,7 @@
           <a:p>
             <a:fld id="{88AEC091-92A8-3744-B3FE-448EBFE3AE7F}" type="datetimeFigureOut">
               <a:rPr lang="en-US" smtClean="0"/>
-              <a:t>2/11/21</a:t>
+              <a:t>6/7/21</a:t>
             </a:fld>
             <a:endParaRPr lang="en-US"/>
           </a:p>
@@ -1461,7 +1573,7 @@
           <a:p>
             <a:fld id="{88AEC091-92A8-3744-B3FE-448EBFE3AE7F}" type="datetimeFigureOut">
               <a:rPr lang="en-US" smtClean="0"/>
-              <a:t>2/11/21</a:t>
+              <a:t>6/7/21</a:t>
             </a:fld>
             <a:endParaRPr lang="en-US"/>
           </a:p>
@@ -1669,7 +1781,7 @@
           <a:p>
             <a:fld id="{88AEC091-92A8-3744-B3FE-448EBFE3AE7F}" type="datetimeFigureOut">
               <a:rPr lang="en-US" smtClean="0"/>
-              <a:t>2/11/21</a:t>
+              <a:t>6/7/21</a:t>
             </a:fld>
             <a:endParaRPr lang="en-US"/>
           </a:p>
@@ -1867,7 +1979,7 @@
           <a:p>
             <a:fld id="{88AEC091-92A8-3744-B3FE-448EBFE3AE7F}" type="datetimeFigureOut">
               <a:rPr lang="en-US" smtClean="0"/>
-              <a:t>2/11/21</a:t>
+              <a:t>6/7/21</a:t>
             </a:fld>
             <a:endParaRPr lang="en-US"/>
           </a:p>
@@ -2142,7 +2254,7 @@
           <a:p>
             <a:fld id="{88AEC091-92A8-3744-B3FE-448EBFE3AE7F}" type="datetimeFigureOut">
               <a:rPr lang="en-US" smtClean="0"/>
-              <a:t>2/11/21</a:t>
+              <a:t>6/7/21</a:t>
             </a:fld>
             <a:endParaRPr lang="en-US"/>
           </a:p>
@@ -2407,7 +2519,7 @@
           <a:p>
             <a:fld id="{88AEC091-92A8-3744-B3FE-448EBFE3AE7F}" type="datetimeFigureOut">
               <a:rPr lang="en-US" smtClean="0"/>
-              <a:t>2/11/21</a:t>
+              <a:t>6/7/21</a:t>
             </a:fld>
             <a:endParaRPr lang="en-US"/>
           </a:p>
@@ -2819,7 +2931,7 @@
           <a:p>
             <a:fld id="{88AEC091-92A8-3744-B3FE-448EBFE3AE7F}" type="datetimeFigureOut">
               <a:rPr lang="en-US" smtClean="0"/>
-              <a:t>2/11/21</a:t>
+              <a:t>6/7/21</a:t>
             </a:fld>
             <a:endParaRPr lang="en-US"/>
           </a:p>
@@ -2960,7 +3072,7 @@
           <a:p>
             <a:fld id="{88AEC091-92A8-3744-B3FE-448EBFE3AE7F}" type="datetimeFigureOut">
               <a:rPr lang="en-US" smtClean="0"/>
-              <a:t>2/11/21</a:t>
+              <a:t>6/7/21</a:t>
             </a:fld>
             <a:endParaRPr lang="en-US"/>
           </a:p>
@@ -3073,7 +3185,7 @@
           <a:p>
             <a:fld id="{88AEC091-92A8-3744-B3FE-448EBFE3AE7F}" type="datetimeFigureOut">
               <a:rPr lang="en-US" smtClean="0"/>
-              <a:t>2/11/21</a:t>
+              <a:t>6/7/21</a:t>
             </a:fld>
             <a:endParaRPr lang="en-US"/>
           </a:p>
@@ -3384,7 +3496,7 @@
           <a:p>
             <a:fld id="{88AEC091-92A8-3744-B3FE-448EBFE3AE7F}" type="datetimeFigureOut">
               <a:rPr lang="en-US" smtClean="0"/>
-              <a:t>2/11/21</a:t>
+              <a:t>6/7/21</a:t>
             </a:fld>
             <a:endParaRPr lang="en-US"/>
           </a:p>
@@ -3672,7 +3784,7 @@
           <a:p>
             <a:fld id="{88AEC091-92A8-3744-B3FE-448EBFE3AE7F}" type="datetimeFigureOut">
               <a:rPr lang="en-US" smtClean="0"/>
-              <a:t>2/11/21</a:t>
+              <a:t>6/7/21</a:t>
             </a:fld>
             <a:endParaRPr lang="en-US"/>
           </a:p>
@@ -3913,7 +4025,7 @@
           <a:p>
             <a:fld id="{88AEC091-92A8-3744-B3FE-448EBFE3AE7F}" type="datetimeFigureOut">
               <a:rPr lang="en-US" smtClean="0"/>
-              <a:t>2/11/21</a:t>
+              <a:t>6/7/21</a:t>
             </a:fld>
             <a:endParaRPr lang="en-US"/>
           </a:p>
@@ -4470,7 +4582,7 @@
           <a:p>
             <a:r>
               <a:rPr lang="en-US" dirty="0"/>
-              <a:t>The scenario. P1</a:t>
+              <a:t>The Scenario P1.</a:t>
             </a:r>
           </a:p>
         </p:txBody>
@@ -4809,7 +4921,7 @@
           <a:p>
             <a:r>
               <a:rPr lang="en-US" dirty="0"/>
-              <a:t>Scenario P.3</a:t>
+              <a:t>The Scenario P.3</a:t>
             </a:r>
           </a:p>
         </p:txBody>
@@ -4895,7 +5007,7 @@
           <a:p>
             <a:r>
               <a:rPr lang="en-US" dirty="0"/>
-              <a:t>Scenario P.4</a:t>
+              <a:t>The Scenario P.4</a:t>
             </a:r>
           </a:p>
         </p:txBody>
@@ -4963,6 +5075,92 @@
           <p:cNvPr id="2" name="Title 1">
             <a:extLst>
               <a:ext uri="{FF2B5EF4-FFF2-40B4-BE49-F238E27FC236}">
+                <a16:creationId xmlns:a16="http://schemas.microsoft.com/office/drawing/2014/main" id="{8A5F5D97-8AE6-7B40-9C7E-103214E34641}"/>
+              </a:ext>
+            </a:extLst>
+          </p:cNvPr>
+          <p:cNvSpPr>
+            <a:spLocks noGrp="1"/>
+          </p:cNvSpPr>
+          <p:nvPr>
+            <p:ph type="title"/>
+          </p:nvPr>
+        </p:nvSpPr>
+        <p:spPr/>
+        <p:txBody>
+          <a:bodyPr/>
+          <a:lstStyle/>
+          <a:p>
+            <a:r>
+              <a:rPr lang="en-US" dirty="0"/>
+              <a:t>The Scenario P.5</a:t>
+            </a:r>
+          </a:p>
+        </p:txBody>
+      </p:sp>
+      <p:sp>
+        <p:nvSpPr>
+          <p:cNvPr id="3" name="Content Placeholder 2">
+            <a:extLst>
+              <a:ext uri="{FF2B5EF4-FFF2-40B4-BE49-F238E27FC236}">
+                <a16:creationId xmlns:a16="http://schemas.microsoft.com/office/drawing/2014/main" id="{21176984-CB54-E542-82ED-D206A5B3D49A}"/>
+              </a:ext>
+            </a:extLst>
+          </p:cNvPr>
+          <p:cNvSpPr>
+            <a:spLocks noGrp="1"/>
+          </p:cNvSpPr>
+          <p:nvPr>
+            <p:ph idx="1"/>
+          </p:nvPr>
+        </p:nvSpPr>
+        <p:spPr/>
+        <p:txBody>
+          <a:bodyPr anchor="ctr"/>
+          <a:lstStyle/>
+          <a:p>
+            <a:r>
+              <a:rPr lang="en-US" dirty="0"/>
+              <a:t>Our lab is going to ‘fork’ a successful project to make it our own.</a:t>
+            </a:r>
+          </a:p>
+        </p:txBody>
+      </p:sp>
+    </p:spTree>
+    <p:extLst>
+      <p:ext uri="{BB962C8B-B14F-4D97-AF65-F5344CB8AC3E}">
+        <p14:creationId xmlns:p14="http://schemas.microsoft.com/office/powerpoint/2010/main" val="3367744546"/>
+      </p:ext>
+    </p:extLst>
+  </p:cSld>
+  <p:clrMapOvr>
+    <a:masterClrMapping/>
+  </p:clrMapOvr>
+</p:sld>
+</file>
+
+<file path=ppt/slides/slide16.xml><?xml version="1.0" encoding="utf-8"?>
+<p:sld xmlns:a="http://schemas.openxmlformats.org/drawingml/2006/main" xmlns:r="http://schemas.openxmlformats.org/officeDocument/2006/relationships" xmlns:p="http://schemas.openxmlformats.org/presentationml/2006/main">
+  <p:cSld>
+    <p:spTree>
+      <p:nvGrpSpPr>
+        <p:cNvPr id="1" name=""/>
+        <p:cNvGrpSpPr/>
+        <p:nvPr/>
+      </p:nvGrpSpPr>
+      <p:grpSpPr>
+        <a:xfrm>
+          <a:off x="0" y="0"/>
+          <a:ext cx="0" cy="0"/>
+          <a:chOff x="0" y="0"/>
+          <a:chExt cx="0" cy="0"/>
+        </a:xfrm>
+      </p:grpSpPr>
+      <p:sp>
+        <p:nvSpPr>
+          <p:cNvPr id="2" name="Title 1">
+            <a:extLst>
+              <a:ext uri="{FF2B5EF4-FFF2-40B4-BE49-F238E27FC236}">
                 <a16:creationId xmlns:a16="http://schemas.microsoft.com/office/drawing/2014/main" id="{B261AA06-411E-564C-AA53-1380C1D0F083}"/>
               </a:ext>
             </a:extLst>
@@ -5045,7 +5243,7 @@
 </p:sld>
 </file>
 
-<file path=ppt/slides/slide16.xml><?xml version="1.0" encoding="utf-8"?>
+<file path=ppt/slides/slide17.xml><?xml version="1.0" encoding="utf-8"?>
 <p:sld xmlns:a="http://schemas.openxmlformats.org/drawingml/2006/main" xmlns:r="http://schemas.openxmlformats.org/officeDocument/2006/relationships" xmlns:p="http://schemas.openxmlformats.org/presentationml/2006/main">
   <p:cSld>
     <p:spTree>
@@ -5604,6 +5802,12 @@
             </a:r>
           </a:p>
           <a:p>
+            <a:r>
+              <a:rPr lang="en-US" dirty="0"/>
+              <a:t>Basic forking</a:t>
+            </a:r>
+          </a:p>
+          <a:p>
             <a:endParaRPr lang="en-US" dirty="0"/>
           </a:p>
           <a:p>
@@ -5717,12 +5921,6 @@
             <a:r>
               <a:rPr lang="en-US" dirty="0"/>
               <a:t>Conflict resolution</a:t>
-            </a:r>
-          </a:p>
-          <a:p>
-            <a:r>
-              <a:rPr lang="en-US" dirty="0"/>
-              <a:t>Forking</a:t>
             </a:r>
           </a:p>
           <a:p>

</xml_diff>

<commit_message>
prep for Feb 18
</commit_message>
<xml_diff>
--- a/Overview.pptx
+++ b/Overview.pptx
@@ -213,7 +213,7 @@
           <a:p>
             <a:fld id="{F6008430-4437-B140-9146-15DEA0EE57B9}" type="datetimeFigureOut">
               <a:rPr lang="en-US" smtClean="0"/>
-              <a:t>6/10/21</a:t>
+              <a:t>2/17/22</a:t>
             </a:fld>
             <a:endParaRPr lang="en-US"/>
           </a:p>
@@ -1375,7 +1375,7 @@
           <a:p>
             <a:fld id="{88AEC091-92A8-3744-B3FE-448EBFE3AE7F}" type="datetimeFigureOut">
               <a:rPr lang="en-US" smtClean="0"/>
-              <a:t>6/10/21</a:t>
+              <a:t>2/17/22</a:t>
             </a:fld>
             <a:endParaRPr lang="en-US"/>
           </a:p>
@@ -1573,7 +1573,7 @@
           <a:p>
             <a:fld id="{88AEC091-92A8-3744-B3FE-448EBFE3AE7F}" type="datetimeFigureOut">
               <a:rPr lang="en-US" smtClean="0"/>
-              <a:t>6/10/21</a:t>
+              <a:t>2/17/22</a:t>
             </a:fld>
             <a:endParaRPr lang="en-US"/>
           </a:p>
@@ -1781,7 +1781,7 @@
           <a:p>
             <a:fld id="{88AEC091-92A8-3744-B3FE-448EBFE3AE7F}" type="datetimeFigureOut">
               <a:rPr lang="en-US" smtClean="0"/>
-              <a:t>6/10/21</a:t>
+              <a:t>2/17/22</a:t>
             </a:fld>
             <a:endParaRPr lang="en-US"/>
           </a:p>
@@ -1979,7 +1979,7 @@
           <a:p>
             <a:fld id="{88AEC091-92A8-3744-B3FE-448EBFE3AE7F}" type="datetimeFigureOut">
               <a:rPr lang="en-US" smtClean="0"/>
-              <a:t>6/10/21</a:t>
+              <a:t>2/17/22</a:t>
             </a:fld>
             <a:endParaRPr lang="en-US"/>
           </a:p>
@@ -2254,7 +2254,7 @@
           <a:p>
             <a:fld id="{88AEC091-92A8-3744-B3FE-448EBFE3AE7F}" type="datetimeFigureOut">
               <a:rPr lang="en-US" smtClean="0"/>
-              <a:t>6/10/21</a:t>
+              <a:t>2/17/22</a:t>
             </a:fld>
             <a:endParaRPr lang="en-US"/>
           </a:p>
@@ -2519,7 +2519,7 @@
           <a:p>
             <a:fld id="{88AEC091-92A8-3744-B3FE-448EBFE3AE7F}" type="datetimeFigureOut">
               <a:rPr lang="en-US" smtClean="0"/>
-              <a:t>6/10/21</a:t>
+              <a:t>2/17/22</a:t>
             </a:fld>
             <a:endParaRPr lang="en-US"/>
           </a:p>
@@ -2931,7 +2931,7 @@
           <a:p>
             <a:fld id="{88AEC091-92A8-3744-B3FE-448EBFE3AE7F}" type="datetimeFigureOut">
               <a:rPr lang="en-US" smtClean="0"/>
-              <a:t>6/10/21</a:t>
+              <a:t>2/17/22</a:t>
             </a:fld>
             <a:endParaRPr lang="en-US"/>
           </a:p>
@@ -3072,7 +3072,7 @@
           <a:p>
             <a:fld id="{88AEC091-92A8-3744-B3FE-448EBFE3AE7F}" type="datetimeFigureOut">
               <a:rPr lang="en-US" smtClean="0"/>
-              <a:t>6/10/21</a:t>
+              <a:t>2/17/22</a:t>
             </a:fld>
             <a:endParaRPr lang="en-US"/>
           </a:p>
@@ -3185,7 +3185,7 @@
           <a:p>
             <a:fld id="{88AEC091-92A8-3744-B3FE-448EBFE3AE7F}" type="datetimeFigureOut">
               <a:rPr lang="en-US" smtClean="0"/>
-              <a:t>6/10/21</a:t>
+              <a:t>2/17/22</a:t>
             </a:fld>
             <a:endParaRPr lang="en-US"/>
           </a:p>
@@ -3496,7 +3496,7 @@
           <a:p>
             <a:fld id="{88AEC091-92A8-3744-B3FE-448EBFE3AE7F}" type="datetimeFigureOut">
               <a:rPr lang="en-US" smtClean="0"/>
-              <a:t>6/10/21</a:t>
+              <a:t>2/17/22</a:t>
             </a:fld>
             <a:endParaRPr lang="en-US"/>
           </a:p>
@@ -3784,7 +3784,7 @@
           <a:p>
             <a:fld id="{88AEC091-92A8-3744-B3FE-448EBFE3AE7F}" type="datetimeFigureOut">
               <a:rPr lang="en-US" smtClean="0"/>
-              <a:t>6/10/21</a:t>
+              <a:t>2/17/22</a:t>
             </a:fld>
             <a:endParaRPr lang="en-US"/>
           </a:p>
@@ -4025,7 +4025,7 @@
           <a:p>
             <a:fld id="{88AEC091-92A8-3744-B3FE-448EBFE3AE7F}" type="datetimeFigureOut">
               <a:rPr lang="en-US" smtClean="0"/>
-              <a:t>6/10/21</a:t>
+              <a:t>2/17/22</a:t>
             </a:fld>
             <a:endParaRPr lang="en-US"/>
           </a:p>
@@ -5121,7 +5121,15 @@
           <a:p>
             <a:r>
               <a:rPr lang="en-US" dirty="0"/>
-              <a:t>Our lab is going to ‘fork’ a successful project to make it our own.</a:t>
+              <a:t>We are going to add a </a:t>
+            </a:r>
+            <a:r>
+              <a:rPr lang="en-US" dirty="0" err="1"/>
+              <a:t>Github</a:t>
+            </a:r>
+            <a:r>
+              <a:rPr lang="en-US" dirty="0"/>
+              <a:t> action to thank collaborators</a:t>
             </a:r>
           </a:p>
         </p:txBody>
@@ -5804,11 +5812,8 @@
           <a:p>
             <a:r>
               <a:rPr lang="en-US" dirty="0"/>
-              <a:t>Basic forking</a:t>
-            </a:r>
-          </a:p>
-          <a:p>
-            <a:endParaRPr lang="en-US" dirty="0"/>
+              <a:t>Adding actions</a:t>
+            </a:r>
           </a:p>
           <a:p>
             <a:endParaRPr lang="en-US" dirty="0"/>

</xml_diff>

<commit_message>
post feb 18 fixes
</commit_message>
<xml_diff>
--- a/Overview.pptx
+++ b/Overview.pptx
@@ -213,7 +213,7 @@
           <a:p>
             <a:fld id="{F6008430-4437-B140-9146-15DEA0EE57B9}" type="datetimeFigureOut">
               <a:rPr lang="en-US" smtClean="0"/>
-              <a:t>2/17/22</a:t>
+              <a:t>2/18/22</a:t>
             </a:fld>
             <a:endParaRPr lang="en-US"/>
           </a:p>
@@ -1375,7 +1375,7 @@
           <a:p>
             <a:fld id="{88AEC091-92A8-3744-B3FE-448EBFE3AE7F}" type="datetimeFigureOut">
               <a:rPr lang="en-US" smtClean="0"/>
-              <a:t>2/17/22</a:t>
+              <a:t>2/18/22</a:t>
             </a:fld>
             <a:endParaRPr lang="en-US"/>
           </a:p>
@@ -1573,7 +1573,7 @@
           <a:p>
             <a:fld id="{88AEC091-92A8-3744-B3FE-448EBFE3AE7F}" type="datetimeFigureOut">
               <a:rPr lang="en-US" smtClean="0"/>
-              <a:t>2/17/22</a:t>
+              <a:t>2/18/22</a:t>
             </a:fld>
             <a:endParaRPr lang="en-US"/>
           </a:p>
@@ -1781,7 +1781,7 @@
           <a:p>
             <a:fld id="{88AEC091-92A8-3744-B3FE-448EBFE3AE7F}" type="datetimeFigureOut">
               <a:rPr lang="en-US" smtClean="0"/>
-              <a:t>2/17/22</a:t>
+              <a:t>2/18/22</a:t>
             </a:fld>
             <a:endParaRPr lang="en-US"/>
           </a:p>
@@ -1979,7 +1979,7 @@
           <a:p>
             <a:fld id="{88AEC091-92A8-3744-B3FE-448EBFE3AE7F}" type="datetimeFigureOut">
               <a:rPr lang="en-US" smtClean="0"/>
-              <a:t>2/17/22</a:t>
+              <a:t>2/18/22</a:t>
             </a:fld>
             <a:endParaRPr lang="en-US"/>
           </a:p>
@@ -2254,7 +2254,7 @@
           <a:p>
             <a:fld id="{88AEC091-92A8-3744-B3FE-448EBFE3AE7F}" type="datetimeFigureOut">
               <a:rPr lang="en-US" smtClean="0"/>
-              <a:t>2/17/22</a:t>
+              <a:t>2/18/22</a:t>
             </a:fld>
             <a:endParaRPr lang="en-US"/>
           </a:p>
@@ -2519,7 +2519,7 @@
           <a:p>
             <a:fld id="{88AEC091-92A8-3744-B3FE-448EBFE3AE7F}" type="datetimeFigureOut">
               <a:rPr lang="en-US" smtClean="0"/>
-              <a:t>2/17/22</a:t>
+              <a:t>2/18/22</a:t>
             </a:fld>
             <a:endParaRPr lang="en-US"/>
           </a:p>
@@ -2931,7 +2931,7 @@
           <a:p>
             <a:fld id="{88AEC091-92A8-3744-B3FE-448EBFE3AE7F}" type="datetimeFigureOut">
               <a:rPr lang="en-US" smtClean="0"/>
-              <a:t>2/17/22</a:t>
+              <a:t>2/18/22</a:t>
             </a:fld>
             <a:endParaRPr lang="en-US"/>
           </a:p>
@@ -3072,7 +3072,7 @@
           <a:p>
             <a:fld id="{88AEC091-92A8-3744-B3FE-448EBFE3AE7F}" type="datetimeFigureOut">
               <a:rPr lang="en-US" smtClean="0"/>
-              <a:t>2/17/22</a:t>
+              <a:t>2/18/22</a:t>
             </a:fld>
             <a:endParaRPr lang="en-US"/>
           </a:p>
@@ -3185,7 +3185,7 @@
           <a:p>
             <a:fld id="{88AEC091-92A8-3744-B3FE-448EBFE3AE7F}" type="datetimeFigureOut">
               <a:rPr lang="en-US" smtClean="0"/>
-              <a:t>2/17/22</a:t>
+              <a:t>2/18/22</a:t>
             </a:fld>
             <a:endParaRPr lang="en-US"/>
           </a:p>
@@ -3496,7 +3496,7 @@
           <a:p>
             <a:fld id="{88AEC091-92A8-3744-B3FE-448EBFE3AE7F}" type="datetimeFigureOut">
               <a:rPr lang="en-US" smtClean="0"/>
-              <a:t>2/17/22</a:t>
+              <a:t>2/18/22</a:t>
             </a:fld>
             <a:endParaRPr lang="en-US"/>
           </a:p>
@@ -3784,7 +3784,7 @@
           <a:p>
             <a:fld id="{88AEC091-92A8-3744-B3FE-448EBFE3AE7F}" type="datetimeFigureOut">
               <a:rPr lang="en-US" smtClean="0"/>
-              <a:t>2/17/22</a:t>
+              <a:t>2/18/22</a:t>
             </a:fld>
             <a:endParaRPr lang="en-US"/>
           </a:p>
@@ -4025,7 +4025,7 @@
           <a:p>
             <a:fld id="{88AEC091-92A8-3744-B3FE-448EBFE3AE7F}" type="datetimeFigureOut">
               <a:rPr lang="en-US" smtClean="0"/>
-              <a:t>2/17/22</a:t>
+              <a:t>2/18/22</a:t>
             </a:fld>
             <a:endParaRPr lang="en-US"/>
           </a:p>
@@ -4785,7 +4785,12 @@
             <p:ph type="title"/>
           </p:nvPr>
         </p:nvSpPr>
-        <p:spPr/>
+        <p:spPr>
+          <a:xfrm>
+            <a:off x="838200" y="365125"/>
+            <a:ext cx="10515600" cy="1325563"/>
+          </a:xfrm>
+        </p:spPr>
         <p:txBody>
           <a:bodyPr/>
           <a:lstStyle/>

</xml_diff>